<commit_message>
Fix equation of Bayes.
</commit_message>
<xml_diff>
--- a/イカサマコインの例で最尤推定とベイズ推定の違いを理解してみる/イカサマコインの例で最尤推定とベイズ推定の違いを理解してみる.pptx
+++ b/イカサマコインの例で最尤推定とベイズ推定の違いを理解してみる/イカサマコインの例で最尤推定とベイズ推定の違いを理解してみる.pptx
@@ -247,7 +247,7 @@
           <a:p>
             <a:fld id="{02BAEFC3-5177-4821-B882-6AA902D5C278}" type="datetimeFigureOut">
               <a:rPr kumimoji="1" lang="ja-JP" altLang="en-US" smtClean="0"/>
-              <a:t>2016/12/8</a:t>
+              <a:t>2016/12/9</a:t>
             </a:fld>
             <a:endParaRPr kumimoji="1" lang="ja-JP" altLang="en-US"/>
           </a:p>
@@ -449,7 +449,7 @@
           <a:p>
             <a:fld id="{02BAEFC3-5177-4821-B882-6AA902D5C278}" type="datetimeFigureOut">
               <a:rPr kumimoji="1" lang="ja-JP" altLang="en-US" smtClean="0"/>
-              <a:t>2016/12/8</a:t>
+              <a:t>2016/12/9</a:t>
             </a:fld>
             <a:endParaRPr kumimoji="1" lang="ja-JP" altLang="en-US"/>
           </a:p>
@@ -661,7 +661,7 @@
           <a:p>
             <a:fld id="{02BAEFC3-5177-4821-B882-6AA902D5C278}" type="datetimeFigureOut">
               <a:rPr kumimoji="1" lang="ja-JP" altLang="en-US" smtClean="0"/>
-              <a:t>2016/12/8</a:t>
+              <a:t>2016/12/9</a:t>
             </a:fld>
             <a:endParaRPr kumimoji="1" lang="ja-JP" altLang="en-US"/>
           </a:p>
@@ -863,7 +863,7 @@
           <a:p>
             <a:fld id="{02BAEFC3-5177-4821-B882-6AA902D5C278}" type="datetimeFigureOut">
               <a:rPr kumimoji="1" lang="ja-JP" altLang="en-US" smtClean="0"/>
-              <a:t>2016/12/8</a:t>
+              <a:t>2016/12/9</a:t>
             </a:fld>
             <a:endParaRPr kumimoji="1" lang="ja-JP" altLang="en-US"/>
           </a:p>
@@ -1109,7 +1109,7 @@
           <a:p>
             <a:fld id="{02BAEFC3-5177-4821-B882-6AA902D5C278}" type="datetimeFigureOut">
               <a:rPr kumimoji="1" lang="ja-JP" altLang="en-US" smtClean="0"/>
-              <a:t>2016/12/8</a:t>
+              <a:t>2016/12/9</a:t>
             </a:fld>
             <a:endParaRPr kumimoji="1" lang="ja-JP" altLang="en-US"/>
           </a:p>
@@ -1405,7 +1405,7 @@
           <a:p>
             <a:fld id="{02BAEFC3-5177-4821-B882-6AA902D5C278}" type="datetimeFigureOut">
               <a:rPr kumimoji="1" lang="ja-JP" altLang="en-US" smtClean="0"/>
-              <a:t>2016/12/8</a:t>
+              <a:t>2016/12/9</a:t>
             </a:fld>
             <a:endParaRPr kumimoji="1" lang="ja-JP" altLang="en-US"/>
           </a:p>
@@ -1836,7 +1836,7 @@
           <a:p>
             <a:fld id="{02BAEFC3-5177-4821-B882-6AA902D5C278}" type="datetimeFigureOut">
               <a:rPr kumimoji="1" lang="ja-JP" altLang="en-US" smtClean="0"/>
-              <a:t>2016/12/8</a:t>
+              <a:t>2016/12/9</a:t>
             </a:fld>
             <a:endParaRPr kumimoji="1" lang="ja-JP" altLang="en-US"/>
           </a:p>
@@ -1954,7 +1954,7 @@
           <a:p>
             <a:fld id="{02BAEFC3-5177-4821-B882-6AA902D5C278}" type="datetimeFigureOut">
               <a:rPr kumimoji="1" lang="ja-JP" altLang="en-US" smtClean="0"/>
-              <a:t>2016/12/8</a:t>
+              <a:t>2016/12/9</a:t>
             </a:fld>
             <a:endParaRPr kumimoji="1" lang="ja-JP" altLang="en-US"/>
           </a:p>
@@ -2049,7 +2049,7 @@
           <a:p>
             <a:fld id="{02BAEFC3-5177-4821-B882-6AA902D5C278}" type="datetimeFigureOut">
               <a:rPr kumimoji="1" lang="ja-JP" altLang="en-US" smtClean="0"/>
-              <a:t>2016/12/8</a:t>
+              <a:t>2016/12/9</a:t>
             </a:fld>
             <a:endParaRPr kumimoji="1" lang="ja-JP" altLang="en-US"/>
           </a:p>
@@ -2358,7 +2358,7 @@
           <a:p>
             <a:fld id="{02BAEFC3-5177-4821-B882-6AA902D5C278}" type="datetimeFigureOut">
               <a:rPr kumimoji="1" lang="ja-JP" altLang="en-US" smtClean="0"/>
-              <a:t>2016/12/8</a:t>
+              <a:t>2016/12/9</a:t>
             </a:fld>
             <a:endParaRPr kumimoji="1" lang="ja-JP" altLang="en-US"/>
           </a:p>
@@ -2611,7 +2611,7 @@
           <a:p>
             <a:fld id="{02BAEFC3-5177-4821-B882-6AA902D5C278}" type="datetimeFigureOut">
               <a:rPr kumimoji="1" lang="ja-JP" altLang="en-US" smtClean="0"/>
-              <a:t>2016/12/8</a:t>
+              <a:t>2016/12/9</a:t>
             </a:fld>
             <a:endParaRPr kumimoji="1" lang="ja-JP" altLang="en-US"/>
           </a:p>
@@ -2856,7 +2856,7 @@
           <a:p>
             <a:fld id="{02BAEFC3-5177-4821-B882-6AA902D5C278}" type="datetimeFigureOut">
               <a:rPr kumimoji="1" lang="ja-JP" altLang="en-US" smtClean="0"/>
-              <a:t>2016/12/8</a:t>
+              <a:t>2016/12/9</a:t>
             </a:fld>
             <a:endParaRPr kumimoji="1" lang="ja-JP" altLang="en-US"/>
           </a:p>
@@ -8444,8 +8444,8 @@
           </a:prstGeom>
         </p:spPr>
       </p:pic>
-      <mc:AlternateContent xmlns:mc="http://schemas.openxmlformats.org/markup-compatibility/2006" xmlns:a14="http://schemas.microsoft.com/office/drawing/2010/main">
-        <mc:Choice Requires="a14">
+      <mc:AlternateContent xmlns:mc="http://schemas.openxmlformats.org/markup-compatibility/2006">
+        <mc:Choice xmlns:a14="http://schemas.microsoft.com/office/drawing/2010/main" Requires="a14">
           <p:sp>
             <p:nvSpPr>
               <p:cNvPr id="4" name="テキスト ボックス 3"/>
@@ -8455,7 +8455,7 @@
             <p:spPr>
               <a:xfrm>
                 <a:off x="8780284" y="636036"/>
-                <a:ext cx="2567882" cy="638252"/>
+                <a:ext cx="2645661" cy="638252"/>
               </a:xfrm>
               <a:prstGeom prst="rect">
                 <a:avLst/>
@@ -8617,7 +8617,7 @@
                                   <a:latin typeface="Cambria Math" panose="02040503050406030204" pitchFamily="18" charset="0"/>
                                   <a:ea typeface="Cambria Math" panose="02040503050406030204" pitchFamily="18" charset="0"/>
                                 </a:rPr>
-                                <m:t>𝑦</m:t>
+                                <m:t>𝑥</m:t>
                               </m:r>
                             </m:e>
                           </m:d>
@@ -8716,7 +8716,7 @@
                                       <a:latin typeface="Cambria Math" panose="02040503050406030204" pitchFamily="18" charset="0"/>
                                       <a:ea typeface="Cambria Math" panose="02040503050406030204" pitchFamily="18" charset="0"/>
                                     </a:rPr>
-                                    <m:t>𝑦</m:t>
+                                    <m:t>𝑥</m:t>
                                   </m:r>
                                 </m:e>
                               </m:d>
@@ -8739,7 +8739,7 @@
             </p:txBody>
           </p:sp>
         </mc:Choice>
-        <mc:Fallback xmlns="">
+        <mc:Fallback>
           <p:sp>
             <p:nvSpPr>
               <p:cNvPr id="4" name="テキスト ボックス 3"/>
@@ -8751,7 +8751,7 @@
             <p:spPr>
               <a:xfrm>
                 <a:off x="8780284" y="636036"/>
-                <a:ext cx="2567882" cy="638252"/>
+                <a:ext cx="2645661" cy="638252"/>
               </a:xfrm>
               <a:prstGeom prst="rect">
                 <a:avLst/>

</xml_diff>